<commit_message>
added names to PPT
</commit_message>
<xml_diff>
--- a/Battleship.pptx
+++ b/Battleship.pptx
@@ -289,7 +289,7 @@
           <a:p>
             <a:fld id="{3C5CF0B1-F594-45EF-847A-7367E6C90F8E}" type="datetimeFigureOut">
               <a:rPr lang="en-US" smtClean="0"/>
-              <a:t>04/25/2018</a:t>
+              <a:t>4/26/2018</a:t>
             </a:fld>
             <a:endParaRPr lang="en-US"/>
           </a:p>
@@ -604,7 +604,7 @@
           <a:p>
             <a:fld id="{3C5CF0B1-F594-45EF-847A-7367E6C90F8E}" type="datetimeFigureOut">
               <a:rPr lang="en-US" smtClean="0"/>
-              <a:t>04/25/2018</a:t>
+              <a:t>4/26/2018</a:t>
             </a:fld>
             <a:endParaRPr lang="en-US"/>
           </a:p>
@@ -826,7 +826,7 @@
           <a:p>
             <a:fld id="{3C5CF0B1-F594-45EF-847A-7367E6C90F8E}" type="datetimeFigureOut">
               <a:rPr lang="en-US" smtClean="0"/>
-              <a:t>04/25/2018</a:t>
+              <a:t>4/26/2018</a:t>
             </a:fld>
             <a:endParaRPr lang="en-US"/>
           </a:p>
@@ -1117,7 +1117,7 @@
           <a:p>
             <a:fld id="{3C5CF0B1-F594-45EF-847A-7367E6C90F8E}" type="datetimeFigureOut">
               <a:rPr lang="en-US" smtClean="0"/>
-              <a:t>04/25/2018</a:t>
+              <a:t>4/26/2018</a:t>
             </a:fld>
             <a:endParaRPr lang="en-US"/>
           </a:p>
@@ -1571,7 +1571,7 @@
           <a:p>
             <a:fld id="{3C5CF0B1-F594-45EF-847A-7367E6C90F8E}" type="datetimeFigureOut">
               <a:rPr lang="en-US" smtClean="0"/>
-              <a:t>04/25/2018</a:t>
+              <a:t>4/26/2018</a:t>
             </a:fld>
             <a:endParaRPr lang="en-US"/>
           </a:p>
@@ -2147,7 +2147,7 @@
           <a:p>
             <a:fld id="{3C5CF0B1-F594-45EF-847A-7367E6C90F8E}" type="datetimeFigureOut">
               <a:rPr lang="en-US" smtClean="0"/>
-              <a:t>04/25/2018</a:t>
+              <a:t>4/26/2018</a:t>
             </a:fld>
             <a:endParaRPr lang="en-US"/>
           </a:p>
@@ -3008,7 +3008,7 @@
           <a:p>
             <a:fld id="{3C5CF0B1-F594-45EF-847A-7367E6C90F8E}" type="datetimeFigureOut">
               <a:rPr lang="en-US" smtClean="0"/>
-              <a:t>04/25/2018</a:t>
+              <a:t>4/26/2018</a:t>
             </a:fld>
             <a:endParaRPr lang="en-US"/>
           </a:p>
@@ -3213,7 +3213,7 @@
           <a:p>
             <a:fld id="{3C5CF0B1-F594-45EF-847A-7367E6C90F8E}" type="datetimeFigureOut">
               <a:rPr lang="en-US" smtClean="0"/>
-              <a:t>04/25/2018</a:t>
+              <a:t>4/26/2018</a:t>
             </a:fld>
             <a:endParaRPr lang="en-US"/>
           </a:p>
@@ -3427,7 +3427,7 @@
           <a:p>
             <a:fld id="{3C5CF0B1-F594-45EF-847A-7367E6C90F8E}" type="datetimeFigureOut">
               <a:rPr lang="en-US" smtClean="0"/>
-              <a:t>04/25/2018</a:t>
+              <a:t>4/26/2018</a:t>
             </a:fld>
             <a:endParaRPr lang="en-US"/>
           </a:p>
@@ -3632,7 +3632,7 @@
           <a:p>
             <a:fld id="{3C5CF0B1-F594-45EF-847A-7367E6C90F8E}" type="datetimeFigureOut">
               <a:rPr lang="en-US" smtClean="0"/>
-              <a:t>04/25/2018</a:t>
+              <a:t>4/26/2018</a:t>
             </a:fld>
             <a:endParaRPr lang="en-US"/>
           </a:p>
@@ -3912,7 +3912,7 @@
           <a:p>
             <a:fld id="{3C5CF0B1-F594-45EF-847A-7367E6C90F8E}" type="datetimeFigureOut">
               <a:rPr lang="en-US" smtClean="0"/>
-              <a:t>04/25/2018</a:t>
+              <a:t>4/26/2018</a:t>
             </a:fld>
             <a:endParaRPr lang="en-US"/>
           </a:p>
@@ -4179,7 +4179,7 @@
           <a:p>
             <a:fld id="{3C5CF0B1-F594-45EF-847A-7367E6C90F8E}" type="datetimeFigureOut">
               <a:rPr lang="en-US" smtClean="0"/>
-              <a:t>04/25/2018</a:t>
+              <a:t>4/26/2018</a:t>
             </a:fld>
             <a:endParaRPr lang="en-US"/>
           </a:p>
@@ -4594,7 +4594,7 @@
           <a:p>
             <a:fld id="{3C5CF0B1-F594-45EF-847A-7367E6C90F8E}" type="datetimeFigureOut">
               <a:rPr lang="en-US" smtClean="0"/>
-              <a:t>04/25/2018</a:t>
+              <a:t>4/26/2018</a:t>
             </a:fld>
             <a:endParaRPr lang="en-US"/>
           </a:p>
@@ -4742,7 +4742,7 @@
           <a:p>
             <a:fld id="{3C5CF0B1-F594-45EF-847A-7367E6C90F8E}" type="datetimeFigureOut">
               <a:rPr lang="en-US" smtClean="0"/>
-              <a:t>04/25/2018</a:t>
+              <a:t>4/26/2018</a:t>
             </a:fld>
             <a:endParaRPr lang="en-US"/>
           </a:p>
@@ -4867,7 +4867,7 @@
           <a:p>
             <a:fld id="{3C5CF0B1-F594-45EF-847A-7367E6C90F8E}" type="datetimeFigureOut">
               <a:rPr lang="en-US" smtClean="0"/>
-              <a:t>04/25/2018</a:t>
+              <a:t>4/26/2018</a:t>
             </a:fld>
             <a:endParaRPr lang="en-US"/>
           </a:p>
@@ -5146,7 +5146,7 @@
           <a:p>
             <a:fld id="{3C5CF0B1-F594-45EF-847A-7367E6C90F8E}" type="datetimeFigureOut">
               <a:rPr lang="en-US" smtClean="0"/>
-              <a:t>04/25/2018</a:t>
+              <a:t>4/26/2018</a:t>
             </a:fld>
             <a:endParaRPr lang="en-US"/>
           </a:p>
@@ -5461,7 +5461,7 @@
           <a:p>
             <a:fld id="{3C5CF0B1-F594-45EF-847A-7367E6C90F8E}" type="datetimeFigureOut">
               <a:rPr lang="en-US" smtClean="0"/>
-              <a:t>04/25/2018</a:t>
+              <a:t>4/26/2018</a:t>
             </a:fld>
             <a:endParaRPr lang="en-US"/>
           </a:p>
@@ -5714,7 +5714,7 @@
           <a:p>
             <a:fld id="{3C5CF0B1-F594-45EF-847A-7367E6C90F8E}" type="datetimeFigureOut">
               <a:rPr lang="en-US" smtClean="0"/>
-              <a:t>04/25/2018</a:t>
+              <a:t>4/26/2018</a:t>
             </a:fld>
             <a:endParaRPr lang="en-US"/>
           </a:p>
@@ -6176,7 +6176,7 @@
         </p:spPr>
         <p:txBody>
           <a:bodyPr>
-            <a:normAutofit fontScale="90000"/>
+            <a:normAutofit/>
           </a:bodyPr>
           <a:lstStyle/>
           <a:p>
@@ -6208,6 +6208,46 @@
           <a:bodyPr/>
           <a:lstStyle/>
           <a:p>
+            <a:r>
+              <a:rPr lang="en-US" dirty="0" smtClean="0"/>
+              <a:t>By JEREMY Thomas, </a:t>
+            </a:r>
+            <a:r>
+              <a:rPr lang="en-US" dirty="0" err="1" smtClean="0"/>
+              <a:t>jared</a:t>
+            </a:r>
+            <a:r>
+              <a:rPr lang="en-US" dirty="0" smtClean="0"/>
+              <a:t> </a:t>
+            </a:r>
+            <a:r>
+              <a:rPr lang="en-US" dirty="0" err="1" smtClean="0"/>
+              <a:t>ridlington</a:t>
+            </a:r>
+            <a:r>
+              <a:rPr lang="en-US" dirty="0" smtClean="0"/>
+              <a:t>, William </a:t>
+            </a:r>
+            <a:r>
+              <a:rPr lang="en-US" dirty="0" err="1" smtClean="0"/>
+              <a:t>brighton</a:t>
+            </a:r>
+            <a:r>
+              <a:rPr lang="en-US" dirty="0" smtClean="0"/>
+              <a:t>, matt </a:t>
+            </a:r>
+            <a:r>
+              <a:rPr lang="en-US" dirty="0" err="1" smtClean="0"/>
+              <a:t>perry</a:t>
+            </a:r>
+            <a:r>
+              <a:rPr lang="en-US" dirty="0" smtClean="0"/>
+              <a:t> and Jason </a:t>
+            </a:r>
+            <a:r>
+              <a:rPr lang="en-US" dirty="0" err="1" smtClean="0"/>
+              <a:t>herning</a:t>
+            </a:r>
             <a:endParaRPr lang="en-US" dirty="0"/>
           </a:p>
         </p:txBody>
@@ -6762,8 +6802,23 @@
           <a:p>
             <a:r>
               <a:rPr lang="en-US" dirty="0" smtClean="0"/>
-              <a:t>Numbering coordinates</a:t>
-            </a:r>
+              <a:t>Numbering </a:t>
+            </a:r>
+            <a:r>
+              <a:rPr lang="en-US" dirty="0" smtClean="0"/>
+              <a:t>coordinates</a:t>
+            </a:r>
+          </a:p>
+          <a:p>
+            <a:r>
+              <a:rPr lang="en-US" dirty="0" smtClean="0"/>
+              <a:t>Ai player for single player </a:t>
+            </a:r>
+            <a:r>
+              <a:rPr lang="en-US" smtClean="0"/>
+              <a:t>capabilities </a:t>
+            </a:r>
+            <a:endParaRPr lang="en-US" dirty="0" smtClean="0"/>
           </a:p>
           <a:p>
             <a:endParaRPr lang="en-US" dirty="0" smtClean="0"/>

</xml_diff>